<commit_message>
GO Final pour présentation
</commit_message>
<xml_diff>
--- a/Présentation_Projet_BxlDigital.pptx
+++ b/Présentation_Projet_BxlDigital.pptx
@@ -11939,12 +11939,12 @@
         <a:fontRef idx="minor"/>
       </dsp:style>
       <dsp:txBody>
-        <a:bodyPr spcFirstLastPara="0" vert="horz" wrap="square" lIns="110490" tIns="110490" rIns="110490" bIns="110490" numCol="1" spcCol="1270" anchor="ctr" anchorCtr="0">
+        <a:bodyPr spcFirstLastPara="0" vert="horz" wrap="square" lIns="114300" tIns="114300" rIns="114300" bIns="114300" numCol="1" spcCol="1270" anchor="ctr" anchorCtr="0">
           <a:noAutofit/>
         </a:bodyPr>
         <a:lstStyle/>
         <a:p>
-          <a:pPr marL="0" lvl="0" indent="0" algn="ctr" defTabSz="1289050">
+          <a:pPr marL="0" lvl="0" indent="0" algn="ctr" defTabSz="1333500">
             <a:lnSpc>
               <a:spcPct val="90000"/>
             </a:lnSpc>
@@ -11956,7 +11956,7 @@
             </a:spcAft>
             <a:buNone/>
           </a:pPr>
-          <a:endParaRPr lang="fr-BE" sz="2900" kern="1200" dirty="0"/>
+          <a:endParaRPr lang="fr-BE" sz="3000" kern="1200" dirty="0"/>
         </a:p>
       </dsp:txBody>
       <dsp:txXfrm>
@@ -12067,12 +12067,12 @@
         <a:fontRef idx="minor"/>
       </dsp:style>
       <dsp:txBody>
-        <a:bodyPr spcFirstLastPara="0" vert="horz" wrap="square" lIns="110490" tIns="110490" rIns="110490" bIns="110490" numCol="1" spcCol="1270" anchor="ctr" anchorCtr="0">
+        <a:bodyPr spcFirstLastPara="0" vert="horz" wrap="square" lIns="114300" tIns="114300" rIns="114300" bIns="114300" numCol="1" spcCol="1270" anchor="ctr" anchorCtr="0">
           <a:noAutofit/>
         </a:bodyPr>
         <a:lstStyle/>
         <a:p>
-          <a:pPr marL="0" lvl="0" indent="0" algn="ctr" defTabSz="1289050">
+          <a:pPr marL="0" lvl="0" indent="0" algn="ctr" defTabSz="1333500">
             <a:lnSpc>
               <a:spcPct val="90000"/>
             </a:lnSpc>
@@ -12084,7 +12084,7 @@
             </a:spcAft>
             <a:buNone/>
           </a:pPr>
-          <a:endParaRPr lang="fr-BE" sz="2900" kern="1200" dirty="0"/>
+          <a:endParaRPr lang="fr-BE" sz="3000" kern="1200" dirty="0"/>
         </a:p>
       </dsp:txBody>
       <dsp:txXfrm>
@@ -12195,12 +12195,12 @@
         <a:fontRef idx="minor"/>
       </dsp:style>
       <dsp:txBody>
-        <a:bodyPr spcFirstLastPara="0" vert="horz" wrap="square" lIns="110490" tIns="110490" rIns="110490" bIns="110490" numCol="1" spcCol="1270" anchor="ctr" anchorCtr="0">
+        <a:bodyPr spcFirstLastPara="0" vert="horz" wrap="square" lIns="114300" tIns="114300" rIns="114300" bIns="114300" numCol="1" spcCol="1270" anchor="ctr" anchorCtr="0">
           <a:noAutofit/>
         </a:bodyPr>
         <a:lstStyle/>
         <a:p>
-          <a:pPr marL="0" lvl="0" indent="0" algn="ctr" defTabSz="1289050">
+          <a:pPr marL="0" lvl="0" indent="0" algn="ctr" defTabSz="1333500">
             <a:lnSpc>
               <a:spcPct val="90000"/>
             </a:lnSpc>
@@ -12212,7 +12212,7 @@
             </a:spcAft>
             <a:buNone/>
           </a:pPr>
-          <a:endParaRPr lang="fr-BE" sz="2900" kern="1200" dirty="0"/>
+          <a:endParaRPr lang="fr-BE" sz="3000" kern="1200" dirty="0"/>
         </a:p>
       </dsp:txBody>
       <dsp:txXfrm>
@@ -12323,12 +12323,12 @@
         <a:fontRef idx="minor"/>
       </dsp:style>
       <dsp:txBody>
-        <a:bodyPr spcFirstLastPara="0" vert="horz" wrap="square" lIns="110490" tIns="110490" rIns="110490" bIns="110490" numCol="1" spcCol="1270" anchor="ctr" anchorCtr="0">
+        <a:bodyPr spcFirstLastPara="0" vert="horz" wrap="square" lIns="114300" tIns="114300" rIns="114300" bIns="114300" numCol="1" spcCol="1270" anchor="ctr" anchorCtr="0">
           <a:noAutofit/>
         </a:bodyPr>
         <a:lstStyle/>
         <a:p>
-          <a:pPr marL="0" lvl="0" indent="0" algn="ctr" defTabSz="1289050">
+          <a:pPr marL="0" lvl="0" indent="0" algn="ctr" defTabSz="1333500">
             <a:lnSpc>
               <a:spcPct val="90000"/>
             </a:lnSpc>
@@ -12340,7 +12340,7 @@
             </a:spcAft>
             <a:buNone/>
           </a:pPr>
-          <a:endParaRPr lang="fr-BE" sz="2900" kern="1200" dirty="0"/>
+          <a:endParaRPr lang="fr-BE" sz="3000" kern="1200" dirty="0"/>
         </a:p>
       </dsp:txBody>
       <dsp:txXfrm>
@@ -12451,12 +12451,12 @@
         <a:fontRef idx="minor"/>
       </dsp:style>
       <dsp:txBody>
-        <a:bodyPr spcFirstLastPara="0" vert="horz" wrap="square" lIns="110490" tIns="110490" rIns="110490" bIns="110490" numCol="1" spcCol="1270" anchor="ctr" anchorCtr="0">
+        <a:bodyPr spcFirstLastPara="0" vert="horz" wrap="square" lIns="114300" tIns="114300" rIns="114300" bIns="114300" numCol="1" spcCol="1270" anchor="ctr" anchorCtr="0">
           <a:noAutofit/>
         </a:bodyPr>
         <a:lstStyle/>
         <a:p>
-          <a:pPr marL="0" lvl="0" indent="0" algn="ctr" defTabSz="1289050">
+          <a:pPr marL="0" lvl="0" indent="0" algn="ctr" defTabSz="1333500">
             <a:lnSpc>
               <a:spcPct val="90000"/>
             </a:lnSpc>
@@ -12468,7 +12468,7 @@
             </a:spcAft>
             <a:buNone/>
           </a:pPr>
-          <a:endParaRPr lang="fr-BE" sz="2900" kern="1200" dirty="0"/>
+          <a:endParaRPr lang="fr-BE" sz="3000" kern="1200" dirty="0"/>
         </a:p>
       </dsp:txBody>
       <dsp:txXfrm>
@@ -12579,12 +12579,12 @@
         <a:fontRef idx="minor"/>
       </dsp:style>
       <dsp:txBody>
-        <a:bodyPr spcFirstLastPara="0" vert="horz" wrap="square" lIns="110490" tIns="110490" rIns="110490" bIns="110490" numCol="1" spcCol="1270" anchor="ctr" anchorCtr="0">
+        <a:bodyPr spcFirstLastPara="0" vert="horz" wrap="square" lIns="114300" tIns="114300" rIns="114300" bIns="114300" numCol="1" spcCol="1270" anchor="ctr" anchorCtr="0">
           <a:noAutofit/>
         </a:bodyPr>
         <a:lstStyle/>
         <a:p>
-          <a:pPr marL="0" lvl="0" indent="0" algn="ctr" defTabSz="1289050">
+          <a:pPr marL="0" lvl="0" indent="0" algn="ctr" defTabSz="1333500">
             <a:lnSpc>
               <a:spcPct val="90000"/>
             </a:lnSpc>
@@ -12596,7 +12596,7 @@
             </a:spcAft>
             <a:buNone/>
           </a:pPr>
-          <a:endParaRPr lang="fr-BE" sz="2900" kern="1200" dirty="0"/>
+          <a:endParaRPr lang="fr-BE" sz="3000" kern="1200" dirty="0"/>
         </a:p>
       </dsp:txBody>
       <dsp:txXfrm>
@@ -12707,12 +12707,12 @@
         <a:fontRef idx="minor"/>
       </dsp:style>
       <dsp:txBody>
-        <a:bodyPr spcFirstLastPara="0" vert="horz" wrap="square" lIns="110490" tIns="110490" rIns="110490" bIns="110490" numCol="1" spcCol="1270" anchor="ctr" anchorCtr="0">
+        <a:bodyPr spcFirstLastPara="0" vert="horz" wrap="square" lIns="114300" tIns="114300" rIns="114300" bIns="114300" numCol="1" spcCol="1270" anchor="ctr" anchorCtr="0">
           <a:noAutofit/>
         </a:bodyPr>
         <a:lstStyle/>
         <a:p>
-          <a:pPr marL="0" lvl="0" indent="0" algn="ctr" defTabSz="1289050">
+          <a:pPr marL="0" lvl="0" indent="0" algn="ctr" defTabSz="1333500">
             <a:lnSpc>
               <a:spcPct val="90000"/>
             </a:lnSpc>
@@ -12724,7 +12724,7 @@
             </a:spcAft>
             <a:buNone/>
           </a:pPr>
-          <a:endParaRPr lang="fr-BE" sz="2900" kern="1200" dirty="0"/>
+          <a:endParaRPr lang="fr-BE" sz="3000" kern="1200" dirty="0"/>
         </a:p>
       </dsp:txBody>
       <dsp:txXfrm>
@@ -12835,12 +12835,12 @@
         <a:fontRef idx="minor"/>
       </dsp:style>
       <dsp:txBody>
-        <a:bodyPr spcFirstLastPara="0" vert="horz" wrap="square" lIns="110490" tIns="110490" rIns="110490" bIns="110490" numCol="1" spcCol="1270" anchor="ctr" anchorCtr="0">
+        <a:bodyPr spcFirstLastPara="0" vert="horz" wrap="square" lIns="114300" tIns="114300" rIns="114300" bIns="114300" numCol="1" spcCol="1270" anchor="ctr" anchorCtr="0">
           <a:noAutofit/>
         </a:bodyPr>
         <a:lstStyle/>
         <a:p>
-          <a:pPr marL="0" lvl="0" indent="0" algn="ctr" defTabSz="1289050">
+          <a:pPr marL="0" lvl="0" indent="0" algn="ctr" defTabSz="1333500">
             <a:lnSpc>
               <a:spcPct val="90000"/>
             </a:lnSpc>
@@ -12852,7 +12852,7 @@
             </a:spcAft>
             <a:buNone/>
           </a:pPr>
-          <a:endParaRPr lang="fr-BE" sz="2900" kern="1200" dirty="0"/>
+          <a:endParaRPr lang="fr-BE" sz="3000" kern="1200" dirty="0"/>
         </a:p>
       </dsp:txBody>
       <dsp:txXfrm>
@@ -12966,12 +12966,12 @@
         </a:fontRef>
       </dsp:style>
       <dsp:txBody>
-        <a:bodyPr spcFirstLastPara="0" vert="horz" wrap="square" lIns="461364" tIns="76200" rIns="76200" bIns="76200" numCol="1" spcCol="1270" anchor="ctr" anchorCtr="0">
+        <a:bodyPr spcFirstLastPara="0" vert="horz" wrap="square" lIns="461364" tIns="78740" rIns="78740" bIns="78740" numCol="1" spcCol="1270" anchor="ctr" anchorCtr="0">
           <a:noAutofit/>
         </a:bodyPr>
         <a:lstStyle/>
         <a:p>
-          <a:pPr marL="0" lvl="0" indent="0" algn="l" defTabSz="1333500">
+          <a:pPr marL="0" lvl="0" indent="0" algn="l" defTabSz="1377950">
             <a:lnSpc>
               <a:spcPct val="90000"/>
             </a:lnSpc>
@@ -12984,7 +12984,7 @@
             <a:buNone/>
           </a:pPr>
           <a:r>
-            <a:rPr lang="fr-BE" sz="3000" kern="1200" dirty="0"/>
+            <a:rPr lang="fr-BE" sz="3100" kern="1200" dirty="0"/>
             <a:t>Organisation</a:t>
           </a:r>
         </a:p>
@@ -13090,12 +13090,12 @@
         </a:fontRef>
       </dsp:style>
       <dsp:txBody>
-        <a:bodyPr spcFirstLastPara="0" vert="horz" wrap="square" lIns="461364" tIns="76200" rIns="76200" bIns="76200" numCol="1" spcCol="1270" anchor="ctr" anchorCtr="0">
+        <a:bodyPr spcFirstLastPara="0" vert="horz" wrap="square" lIns="461364" tIns="78740" rIns="78740" bIns="78740" numCol="1" spcCol="1270" anchor="ctr" anchorCtr="0">
           <a:noAutofit/>
         </a:bodyPr>
         <a:lstStyle/>
         <a:p>
-          <a:pPr marL="0" lvl="0" indent="0" algn="l" defTabSz="1333500">
+          <a:pPr marL="0" lvl="0" indent="0" algn="l" defTabSz="1377950">
             <a:lnSpc>
               <a:spcPct val="90000"/>
             </a:lnSpc>
@@ -13108,7 +13108,7 @@
             <a:buNone/>
           </a:pPr>
           <a:r>
-            <a:rPr lang="fr-BE" sz="3000" kern="1200" dirty="0"/>
+            <a:rPr lang="fr-BE" sz="3100" kern="1200" dirty="0"/>
             <a:t>Informations</a:t>
           </a:r>
         </a:p>
@@ -13214,12 +13214,12 @@
         </a:fontRef>
       </dsp:style>
       <dsp:txBody>
-        <a:bodyPr spcFirstLastPara="0" vert="horz" wrap="square" lIns="461364" tIns="76200" rIns="76200" bIns="76200" numCol="1" spcCol="1270" anchor="ctr" anchorCtr="0">
+        <a:bodyPr spcFirstLastPara="0" vert="horz" wrap="square" lIns="461364" tIns="78740" rIns="78740" bIns="78740" numCol="1" spcCol="1270" anchor="ctr" anchorCtr="0">
           <a:noAutofit/>
         </a:bodyPr>
         <a:lstStyle/>
         <a:p>
-          <a:pPr marL="0" lvl="0" indent="0" algn="l" defTabSz="1333500">
+          <a:pPr marL="0" lvl="0" indent="0" algn="l" defTabSz="1377950">
             <a:lnSpc>
               <a:spcPct val="90000"/>
             </a:lnSpc>
@@ -13232,7 +13232,7 @@
             <a:buNone/>
           </a:pPr>
           <a:r>
-            <a:rPr lang="fr-BE" sz="3000" kern="1200" dirty="0"/>
+            <a:rPr lang="fr-BE" sz="3100" kern="1200" dirty="0"/>
             <a:t>Suivi</a:t>
           </a:r>
         </a:p>
@@ -13338,12 +13338,12 @@
         </a:fontRef>
       </dsp:style>
       <dsp:txBody>
-        <a:bodyPr spcFirstLastPara="0" vert="horz" wrap="square" lIns="461364" tIns="76200" rIns="76200" bIns="76200" numCol="1" spcCol="1270" anchor="ctr" anchorCtr="0">
+        <a:bodyPr spcFirstLastPara="0" vert="horz" wrap="square" lIns="461364" tIns="78740" rIns="78740" bIns="78740" numCol="1" spcCol="1270" anchor="ctr" anchorCtr="0">
           <a:noAutofit/>
         </a:bodyPr>
         <a:lstStyle/>
         <a:p>
-          <a:pPr marL="0" lvl="0" indent="0" algn="l" defTabSz="1333500">
+          <a:pPr marL="0" lvl="0" indent="0" algn="l" defTabSz="1377950">
             <a:lnSpc>
               <a:spcPct val="90000"/>
             </a:lnSpc>
@@ -13356,7 +13356,7 @@
             <a:buNone/>
           </a:pPr>
           <a:r>
-            <a:rPr lang="fr-BE" sz="3000" kern="1200" dirty="0"/>
+            <a:rPr lang="fr-BE" sz="3100" kern="1200" dirty="0"/>
             <a:t>Annexes</a:t>
           </a:r>
         </a:p>
@@ -16080,7 +16080,7 @@
       </dsp:nvSpPr>
       <dsp:spPr>
         <a:xfrm>
-          <a:off x="4434" y="860294"/>
+          <a:off x="4434" y="884594"/>
           <a:ext cx="2016151" cy="691200"/>
         </a:xfrm>
         <a:prstGeom prst="roundRect">
@@ -16146,7 +16146,7 @@
         </a:p>
       </dsp:txBody>
       <dsp:txXfrm>
-        <a:off x="4434" y="860294"/>
+        <a:off x="4434" y="884594"/>
         <a:ext cx="2016151" cy="460800"/>
       </dsp:txXfrm>
     </dsp:sp>
@@ -16157,8 +16157,8 @@
       </dsp:nvSpPr>
       <dsp:spPr>
         <a:xfrm>
-          <a:off x="417380" y="1321094"/>
-          <a:ext cx="2016151" cy="2089800"/>
+          <a:off x="417380" y="1345394"/>
+          <a:ext cx="2016151" cy="2041200"/>
         </a:xfrm>
         <a:prstGeom prst="roundRect">
           <a:avLst>
@@ -16244,8 +16244,8 @@
         </a:p>
       </dsp:txBody>
       <dsp:txXfrm>
-        <a:off x="476431" y="1380145"/>
-        <a:ext cx="1898049" cy="1971698"/>
+        <a:off x="476431" y="1404445"/>
+        <a:ext cx="1898049" cy="1923098"/>
       </dsp:txXfrm>
     </dsp:sp>
     <dsp:sp modelId="{EC052AD9-67F6-4933-9562-F92FDBF13875}">
@@ -16255,7 +16255,7 @@
       </dsp:nvSpPr>
       <dsp:spPr>
         <a:xfrm>
-          <a:off x="2326227" y="839712"/>
+          <a:off x="2326227" y="864012"/>
           <a:ext cx="647959" cy="501963"/>
         </a:xfrm>
         <a:prstGeom prst="rightArrow">
@@ -16319,7 +16319,7 @@
         </a:p>
       </dsp:txBody>
       <dsp:txXfrm>
-        <a:off x="2326227" y="940105"/>
+        <a:off x="2326227" y="964405"/>
         <a:ext cx="497370" cy="301177"/>
       </dsp:txXfrm>
     </dsp:sp>
@@ -16330,7 +16330,7 @@
       </dsp:nvSpPr>
       <dsp:spPr>
         <a:xfrm>
-          <a:off x="3243150" y="860294"/>
+          <a:off x="3243150" y="884594"/>
           <a:ext cx="2016151" cy="691200"/>
         </a:xfrm>
         <a:prstGeom prst="roundRect">
@@ -16396,7 +16396,7 @@
         </a:p>
       </dsp:txBody>
       <dsp:txXfrm>
-        <a:off x="3243150" y="860294"/>
+        <a:off x="3243150" y="884594"/>
         <a:ext cx="2016151" cy="460800"/>
       </dsp:txXfrm>
     </dsp:sp>
@@ -16407,8 +16407,8 @@
       </dsp:nvSpPr>
       <dsp:spPr>
         <a:xfrm>
-          <a:off x="3656097" y="1321094"/>
-          <a:ext cx="2016151" cy="2089800"/>
+          <a:off x="3656097" y="1345394"/>
+          <a:ext cx="2016151" cy="2041200"/>
         </a:xfrm>
         <a:prstGeom prst="roundRect">
           <a:avLst>
@@ -16549,8 +16549,8 @@
         </a:p>
       </dsp:txBody>
       <dsp:txXfrm>
-        <a:off x="3715148" y="1380145"/>
-        <a:ext cx="1898049" cy="1971698"/>
+        <a:off x="3715148" y="1404445"/>
+        <a:ext cx="1898049" cy="1923098"/>
       </dsp:txXfrm>
     </dsp:sp>
     <dsp:sp modelId="{0043F09C-E632-4838-B523-ABDC20A30FD7}">
@@ -16560,7 +16560,7 @@
       </dsp:nvSpPr>
       <dsp:spPr>
         <a:xfrm>
-          <a:off x="5564943" y="839712"/>
+          <a:off x="5564943" y="864012"/>
           <a:ext cx="647959" cy="501963"/>
         </a:xfrm>
         <a:prstGeom prst="rightArrow">
@@ -16624,7 +16624,7 @@
         </a:p>
       </dsp:txBody>
       <dsp:txXfrm>
-        <a:off x="5564943" y="940105"/>
+        <a:off x="5564943" y="964405"/>
         <a:ext cx="497370" cy="301177"/>
       </dsp:txXfrm>
     </dsp:sp>
@@ -16635,7 +16635,7 @@
       </dsp:nvSpPr>
       <dsp:spPr>
         <a:xfrm>
-          <a:off x="6481867" y="860294"/>
+          <a:off x="6481867" y="884594"/>
           <a:ext cx="2016151" cy="691200"/>
         </a:xfrm>
         <a:prstGeom prst="roundRect">
@@ -16701,7 +16701,7 @@
         </a:p>
       </dsp:txBody>
       <dsp:txXfrm>
-        <a:off x="6481867" y="860294"/>
+        <a:off x="6481867" y="884594"/>
         <a:ext cx="2016151" cy="460800"/>
       </dsp:txXfrm>
     </dsp:sp>
@@ -16712,8 +16712,8 @@
       </dsp:nvSpPr>
       <dsp:spPr>
         <a:xfrm>
-          <a:off x="6894814" y="1321094"/>
-          <a:ext cx="2016151" cy="2089800"/>
+          <a:off x="6894814" y="1345394"/>
+          <a:ext cx="2016151" cy="2041200"/>
         </a:xfrm>
         <a:prstGeom prst="roundRect">
           <a:avLst>
@@ -16814,8 +16814,8 @@
         </a:p>
       </dsp:txBody>
       <dsp:txXfrm>
-        <a:off x="6953865" y="1380145"/>
-        <a:ext cx="1898049" cy="1971698"/>
+        <a:off x="6953865" y="1404445"/>
+        <a:ext cx="1898049" cy="1923098"/>
       </dsp:txXfrm>
     </dsp:sp>
   </dsp:spTree>
@@ -30749,7 +30749,23 @@
             </a:r>
             <a:r>
               <a:rPr lang="fr-BE" dirty="0"/>
-              <a:t> consomme mon API ainsi que différentes API et bibliothèques externes</a:t>
+              <a:t> consomme mon API pour les données </a:t>
+            </a:r>
+            <a:r>
+              <a:rPr lang="fr-BE" dirty="0" err="1"/>
+              <a:t>utilsateurs</a:t>
+            </a:r>
+            <a:r>
+              <a:rPr lang="fr-BE" dirty="0"/>
+              <a:t> ainsi que différentes API et bibliothèques externes pour des données telles que la géolocalisation ou des données </a:t>
+            </a:r>
+            <a:r>
+              <a:rPr lang="fr-BE" dirty="0" err="1"/>
+              <a:t>méto</a:t>
+            </a:r>
+            <a:r>
+              <a:rPr lang="fr-BE" dirty="0"/>
+              <a:t>.</a:t>
             </a:r>
           </a:p>
         </p:txBody>
@@ -30944,7 +30960,23 @@
             </a:pPr>
             <a:r>
               <a:rPr lang="fr-BE" dirty="0"/>
-              <a:t>Créer une page dynamique. Choix de partir en ASP MVC plutôt que BLAZOR. </a:t>
+              <a:t>Créer une navigation la plus dynamique. Possible. Mais Choix de partir en ASP MVC plutôt que </a:t>
+            </a:r>
+            <a:r>
+              <a:rPr lang="fr-BE" dirty="0" err="1"/>
+              <a:t>framework</a:t>
+            </a:r>
+            <a:r>
+              <a:rPr lang="fr-BE" dirty="0"/>
+              <a:t> </a:t>
+            </a:r>
+            <a:r>
+              <a:rPr lang="fr-BE" dirty="0" err="1"/>
+              <a:t>front-end</a:t>
+            </a:r>
+            <a:r>
+              <a:rPr lang="fr-BE" dirty="0"/>
+              <a:t>( BLAZOR ou …. </a:t>
             </a:r>
           </a:p>
           <a:p>
@@ -30973,12 +31005,8 @@
               <a:buChar char="•"/>
             </a:pPr>
             <a:r>
-              <a:rPr lang="fr-BE" dirty="0" err="1"/>
-              <a:t>Nécéssite</a:t>
-            </a:r>
-            <a:r>
               <a:rPr lang="fr-BE" dirty="0"/>
-              <a:t> d’apprendre JS en profondeur pour.</a:t>
+              <a:t>Nécessité d’apprendre JS en profondeur pour.</a:t>
             </a:r>
           </a:p>
           <a:p>
@@ -30995,15 +31023,7 @@
             </a:pPr>
             <a:r>
               <a:rPr lang="fr-BE" dirty="0"/>
-              <a:t>Ce que j’ai </a:t>
-            </a:r>
-            <a:r>
-              <a:rPr lang="fr-BE" dirty="0" err="1"/>
-              <a:t>aprris</a:t>
-            </a:r>
-            <a:r>
-              <a:rPr lang="fr-BE" dirty="0"/>
-              <a:t> de : ces difficultés, de la réalisation du projet, et de la formation.</a:t>
+              <a:t>Ce que je retiens de : ces difficultés, de la réalisation du projet, et de la formation.</a:t>
             </a:r>
           </a:p>
           <a:p>
@@ -31013,7 +31033,15 @@
             </a:pPr>
             <a:r>
               <a:rPr lang="fr-BE" dirty="0"/>
-              <a:t>Importance de construire une application de la manière la plus structurée, la plus cohérente possible, càd :</a:t>
+              <a:t>Importance d’organiser son code </a:t>
+            </a:r>
+            <a:r>
+              <a:rPr lang="fr-BE"/>
+              <a:t>et de construire </a:t>
+            </a:r>
+            <a:r>
+              <a:rPr lang="fr-BE" dirty="0"/>
+              <a:t>une application de la manière la plus structurée, la plus cohérente possible, càd :</a:t>
             </a:r>
           </a:p>
           <a:p>
@@ -31023,7 +31051,7 @@
             </a:pPr>
             <a:r>
               <a:rPr lang="fr-BE" dirty="0"/>
-              <a:t>Réduire les dépendances</a:t>
+              <a:t>Réduire les dépendances entre les parties du codes.</a:t>
             </a:r>
           </a:p>
           <a:p>
@@ -31050,7 +31078,15 @@
             </a:pPr>
             <a:r>
               <a:rPr lang="fr-BE" dirty="0"/>
-              <a:t>Respect de ces principes =&gt; a permis de faciliter</a:t>
+              <a:t>PQ ? </a:t>
+            </a:r>
+            <a:r>
+              <a:rPr lang="fr-BE" dirty="0" err="1"/>
+              <a:t>Pcque</a:t>
+            </a:r>
+            <a:r>
+              <a:rPr lang="fr-BE" dirty="0"/>
+              <a:t> … bien organiser son code permet de faciliter</a:t>
             </a:r>
           </a:p>
           <a:p>

</xml_diff>